<commit_message>
update to presentation and demo
</commit_message>
<xml_diff>
--- a/presentation/Presentation.pptx
+++ b/presentation/Presentation.pptx
@@ -16,6 +16,7 @@
     <p:sldId id="260" r:id="rId10"/>
     <p:sldId id="264" r:id="rId11"/>
     <p:sldId id="263" r:id="rId12"/>
+    <p:sldId id="268" r:id="rId13"/>
   </p:sldIdLst>
   <p:sldSz cx="12192000" cy="6858000"/>
   <p:notesSz cx="6858000" cy="9144000"/>
@@ -127,6 +128,7 @@
   <p1510:revLst>
     <p1510:client id="{338D54B9-B569-4E88-8A01-E2EE2AE86293}" v="1210" dt="2022-07-26T16:12:51.505"/>
     <p1510:client id="{4176C984-F91B-4C7C-ABEB-1CDEA6A822A3}" v="4" dt="2022-07-26T16:15:46.356"/>
+    <p1510:client id="{6B89D6CC-F7CE-4B58-A18C-0A7B6075E42F}" v="45" dt="2022-07-29T10:43:48.841"/>
     <p1510:client id="{B46BB6E6-7095-4E63-9C95-3908B2BDDBDB}" v="120" dt="2022-07-27T02:47:52.624"/>
     <p1510:client id="{D9561ED4-D12C-4F96-863D-A82B66D58FD4}" v="838" dt="2022-07-28T22:32:03.041"/>
   </p1510:revLst>
@@ -264,7 +266,7 @@
           <a:p>
             <a:fld id="{846CE7D5-CF57-46EF-B807-FDD0502418D4}" type="datetimeFigureOut">
               <a:rPr lang="en-US" smtClean="0"/>
-              <a:t>7/28/2022</a:t>
+              <a:t>7/29/2022</a:t>
             </a:fld>
             <a:endParaRPr lang="en-US"/>
           </a:p>
@@ -434,7 +436,7 @@
           <a:p>
             <a:fld id="{846CE7D5-CF57-46EF-B807-FDD0502418D4}" type="datetimeFigureOut">
               <a:rPr lang="en-US" smtClean="0"/>
-              <a:t>7/28/2022</a:t>
+              <a:t>7/29/2022</a:t>
             </a:fld>
             <a:endParaRPr lang="en-US"/>
           </a:p>
@@ -614,7 +616,7 @@
           <a:p>
             <a:fld id="{846CE7D5-CF57-46EF-B807-FDD0502418D4}" type="datetimeFigureOut">
               <a:rPr lang="en-US" smtClean="0"/>
-              <a:t>7/28/2022</a:t>
+              <a:t>7/29/2022</a:t>
             </a:fld>
             <a:endParaRPr lang="en-US"/>
           </a:p>
@@ -784,7 +786,7 @@
           <a:p>
             <a:fld id="{846CE7D5-CF57-46EF-B807-FDD0502418D4}" type="datetimeFigureOut">
               <a:rPr lang="en-US" smtClean="0"/>
-              <a:t>7/28/2022</a:t>
+              <a:t>7/29/2022</a:t>
             </a:fld>
             <a:endParaRPr lang="en-US"/>
           </a:p>
@@ -1030,7 +1032,7 @@
           <a:p>
             <a:fld id="{846CE7D5-CF57-46EF-B807-FDD0502418D4}" type="datetimeFigureOut">
               <a:rPr lang="en-US" smtClean="0"/>
-              <a:t>7/28/2022</a:t>
+              <a:t>7/29/2022</a:t>
             </a:fld>
             <a:endParaRPr lang="en-US"/>
           </a:p>
@@ -1262,7 +1264,7 @@
           <a:p>
             <a:fld id="{846CE7D5-CF57-46EF-B807-FDD0502418D4}" type="datetimeFigureOut">
               <a:rPr lang="en-US" smtClean="0"/>
-              <a:t>7/28/2022</a:t>
+              <a:t>7/29/2022</a:t>
             </a:fld>
             <a:endParaRPr lang="en-US"/>
           </a:p>
@@ -1629,7 +1631,7 @@
           <a:p>
             <a:fld id="{846CE7D5-CF57-46EF-B807-FDD0502418D4}" type="datetimeFigureOut">
               <a:rPr lang="en-US" smtClean="0"/>
-              <a:t>7/28/2022</a:t>
+              <a:t>7/29/2022</a:t>
             </a:fld>
             <a:endParaRPr lang="en-US"/>
           </a:p>
@@ -1747,7 +1749,7 @@
           <a:p>
             <a:fld id="{846CE7D5-CF57-46EF-B807-FDD0502418D4}" type="datetimeFigureOut">
               <a:rPr lang="en-US" smtClean="0"/>
-              <a:t>7/28/2022</a:t>
+              <a:t>7/29/2022</a:t>
             </a:fld>
             <a:endParaRPr lang="en-US"/>
           </a:p>
@@ -1842,7 +1844,7 @@
           <a:p>
             <a:fld id="{846CE7D5-CF57-46EF-B807-FDD0502418D4}" type="datetimeFigureOut">
               <a:rPr lang="en-US" smtClean="0"/>
-              <a:t>7/28/2022</a:t>
+              <a:t>7/29/2022</a:t>
             </a:fld>
             <a:endParaRPr lang="en-US"/>
           </a:p>
@@ -2119,7 +2121,7 @@
           <a:p>
             <a:fld id="{846CE7D5-CF57-46EF-B807-FDD0502418D4}" type="datetimeFigureOut">
               <a:rPr lang="en-US" smtClean="0"/>
-              <a:t>7/28/2022</a:t>
+              <a:t>7/29/2022</a:t>
             </a:fld>
             <a:endParaRPr lang="en-US"/>
           </a:p>
@@ -2376,7 +2378,7 @@
           <a:p>
             <a:fld id="{846CE7D5-CF57-46EF-B807-FDD0502418D4}" type="datetimeFigureOut">
               <a:rPr lang="en-US" smtClean="0"/>
-              <a:t>7/28/2022</a:t>
+              <a:t>7/29/2022</a:t>
             </a:fld>
             <a:endParaRPr lang="en-US"/>
           </a:p>
@@ -2589,7 +2591,7 @@
           <a:p>
             <a:fld id="{846CE7D5-CF57-46EF-B807-FDD0502418D4}" type="datetimeFigureOut">
               <a:rPr lang="en-US" smtClean="0"/>
-              <a:t>7/28/2022</a:t>
+              <a:t>7/29/2022</a:t>
             </a:fld>
             <a:endParaRPr lang="en-US"/>
           </a:p>
@@ -3738,6 +3740,72 @@
 </p:sld>
 </file>
 
+<file path=ppt/slides/slide12.xml><?xml version="1.0" encoding="utf-8"?>
+<p:sld xmlns:a="http://schemas.openxmlformats.org/drawingml/2006/main" xmlns:r="http://schemas.openxmlformats.org/officeDocument/2006/relationships" xmlns:p="http://schemas.openxmlformats.org/presentationml/2006/main">
+  <p:cSld>
+    <p:spTree>
+      <p:nvGrpSpPr>
+        <p:cNvPr id="1" name=""/>
+        <p:cNvGrpSpPr/>
+        <p:nvPr/>
+      </p:nvGrpSpPr>
+      <p:grpSpPr>
+        <a:xfrm>
+          <a:off x="0" y="0"/>
+          <a:ext cx="0" cy="0"/>
+          <a:chOff x="0" y="0"/>
+          <a:chExt cx="0" cy="0"/>
+        </a:xfrm>
+      </p:grpSpPr>
+      <p:sp>
+        <p:nvSpPr>
+          <p:cNvPr id="2" name="Title 1">
+            <a:extLst>
+              <a:ext uri="{FF2B5EF4-FFF2-40B4-BE49-F238E27FC236}">
+                <a16:creationId xmlns:a16="http://schemas.microsoft.com/office/drawing/2014/main" id="{1055C60C-BDAD-541F-AC27-91F69EA7A086}"/>
+              </a:ext>
+            </a:extLst>
+          </p:cNvPr>
+          <p:cNvSpPr>
+            <a:spLocks noGrp="1"/>
+          </p:cNvSpPr>
+          <p:nvPr>
+            <p:ph type="title"/>
+          </p:nvPr>
+        </p:nvSpPr>
+        <p:spPr>
+          <a:xfrm>
+            <a:off x="838200" y="365125"/>
+            <a:ext cx="10515600" cy="5794081"/>
+          </a:xfrm>
+        </p:spPr>
+        <p:txBody>
+          <a:bodyPr/>
+          <a:lstStyle/>
+          <a:p>
+            <a:pPr algn="ctr"/>
+            <a:r>
+              <a:rPr lang="en-US" dirty="0">
+                <a:cs typeface="Calibri Light"/>
+              </a:rPr>
+              <a:t>Thank you!</a:t>
+            </a:r>
+          </a:p>
+        </p:txBody>
+      </p:sp>
+    </p:spTree>
+    <p:extLst>
+      <p:ext uri="{BB962C8B-B14F-4D97-AF65-F5344CB8AC3E}">
+        <p14:creationId xmlns:p14="http://schemas.microsoft.com/office/powerpoint/2010/main" val="1239522526"/>
+      </p:ext>
+    </p:extLst>
+  </p:cSld>
+  <p:clrMapOvr>
+    <a:masterClrMapping/>
+  </p:clrMapOvr>
+</p:sld>
+</file>
+
 <file path=ppt/slides/slide2.xml><?xml version="1.0" encoding="utf-8"?>
 <p:sld xmlns:a="http://schemas.openxmlformats.org/drawingml/2006/main" xmlns:r="http://schemas.openxmlformats.org/officeDocument/2006/relationships" xmlns:p="http://schemas.openxmlformats.org/presentationml/2006/main">
   <p:cSld>
@@ -7129,7 +7197,7 @@
         </p:spPr>
         <p:txBody>
           <a:bodyPr vert="horz" lIns="91440" tIns="45720" rIns="91440" bIns="45720" rtlCol="0" anchor="t">
-            <a:normAutofit fontScale="70000" lnSpcReduction="20000"/>
+            <a:normAutofit fontScale="62500" lnSpcReduction="20000"/>
           </a:bodyPr>
           <a:lstStyle/>
           <a:p>
@@ -7291,8 +7359,22 @@
             </a:pPr>
             <a:r>
               <a:rPr lang="en-US" sz="1800" dirty="0">
+                <a:ea typeface="+mn-lt"/>
+                <a:cs typeface="+mn-lt"/>
+                <a:hlinkClick r:id="rId4"/>
+              </a:rPr>
+              <a:t>https://jakearchibald.com/2015/tasks-microtasks-queues-and-schedules/</a:t>
+            </a:r>
+            <a:endParaRPr lang="en-US"/>
+          </a:p>
+          <a:p>
+            <a:pPr marL="0" indent="0">
+              <a:buNone/>
+            </a:pPr>
+            <a:r>
+              <a:rPr lang="en-US" sz="1800" dirty="0">
                 <a:cs typeface="Calibri"/>
-                <a:hlinkClick r:id="rId4"/>
+                <a:hlinkClick r:id="rId5"/>
               </a:rPr>
               <a:t>https://github.com/angular/angular/blob/main/packages/zone.js/lib/zone.ts</a:t>
             </a:r>
@@ -7308,7 +7390,7 @@
             <a:r>
               <a:rPr lang="en-US" sz="1800" dirty="0">
                 <a:cs typeface="Calibri"/>
-                <a:hlinkClick r:id="rId5"/>
+                <a:hlinkClick r:id="rId6"/>
               </a:rPr>
               <a:t>https://github.com/angular/angular/tree/main/packages/zone.js/example</a:t>
             </a:r>
@@ -7324,7 +7406,7 @@
             <a:r>
               <a:rPr lang="en-US" sz="1800" dirty="0">
                 <a:cs typeface="Calibri"/>
-                <a:hlinkClick r:id="rId6"/>
+                <a:hlinkClick r:id="rId7"/>
               </a:rPr>
               <a:t>https://angular.io/guide/change-detection-zone-pollution</a:t>
             </a:r>
@@ -7340,7 +7422,7 @@
             <a:r>
               <a:rPr lang="en-US" sz="1800" dirty="0">
                 <a:cs typeface="Calibri"/>
-                <a:hlinkClick r:id="rId7"/>
+                <a:hlinkClick r:id="rId8"/>
               </a:rPr>
               <a:t>https://angular.io/guide/zone</a:t>
             </a:r>
@@ -7355,7 +7437,7 @@
             <a:r>
               <a:rPr lang="en-US" sz="1800" dirty="0">
                 <a:cs typeface="Calibri"/>
-                <a:hlinkClick r:id="rId8"/>
+                <a:hlinkClick r:id="rId9"/>
               </a:rPr>
               <a:t>https://www.w3schools.com/js/js_this.asp</a:t>
             </a:r>
@@ -7371,7 +7453,7 @@
             <a:r>
               <a:rPr lang="en-US" sz="1800" dirty="0">
                 <a:cs typeface="Calibri"/>
-                <a:hlinkClick r:id="rId9"/>
+                <a:hlinkClick r:id="rId10"/>
               </a:rPr>
               <a:t>https://www.youtube.com/watch?v=3IqtmUscE_U&amp;t=150s&amp;ab_channel=ng-conf</a:t>
             </a:r>
@@ -7387,7 +7469,7 @@
             <a:r>
               <a:rPr lang="en-US" sz="1800" dirty="0">
                 <a:cs typeface="Calibri"/>
-                <a:hlinkClick r:id="rId10"/>
+                <a:hlinkClick r:id="rId11"/>
               </a:rPr>
               <a:t>https://medium.com/swlh/what-is-zone-js-and-how-can-i-use-it-63ce08a55962</a:t>
             </a:r>

</xml_diff>